<commit_message>
Writing out COG and SOG
May be a little buggy.
</commit_message>
<xml_diff>
--- a/IES Model Extension Documentation.pptx
+++ b/IES Model Extension Documentation.pptx
@@ -324,7 +324,7 @@
           <a:p>
             <a:fld id="{9C217E9C-8F4D-924D-9E3C-AB228D9DE283}" type="datetimeFigureOut">
               <a:rPr lang="en-GB" smtClean="0"/>
-              <a:t>08/03/2021</a:t>
+              <a:t>16/03/2021</a:t>
             </a:fld>
             <a:endParaRPr lang="en-GB"/>
           </a:p>
@@ -522,7 +522,7 @@
           <a:p>
             <a:fld id="{9C217E9C-8F4D-924D-9E3C-AB228D9DE283}" type="datetimeFigureOut">
               <a:rPr lang="en-GB" smtClean="0"/>
-              <a:t>08/03/2021</a:t>
+              <a:t>16/03/2021</a:t>
             </a:fld>
             <a:endParaRPr lang="en-GB"/>
           </a:p>
@@ -730,7 +730,7 @@
           <a:p>
             <a:fld id="{9C217E9C-8F4D-924D-9E3C-AB228D9DE283}" type="datetimeFigureOut">
               <a:rPr lang="en-GB" smtClean="0"/>
-              <a:t>08/03/2021</a:t>
+              <a:t>16/03/2021</a:t>
             </a:fld>
             <a:endParaRPr lang="en-GB"/>
           </a:p>
@@ -928,7 +928,7 @@
           <a:p>
             <a:fld id="{9C217E9C-8F4D-924D-9E3C-AB228D9DE283}" type="datetimeFigureOut">
               <a:rPr lang="en-GB" smtClean="0"/>
-              <a:t>08/03/2021</a:t>
+              <a:t>16/03/2021</a:t>
             </a:fld>
             <a:endParaRPr lang="en-GB"/>
           </a:p>
@@ -1203,7 +1203,7 @@
           <a:p>
             <a:fld id="{9C217E9C-8F4D-924D-9E3C-AB228D9DE283}" type="datetimeFigureOut">
               <a:rPr lang="en-GB" smtClean="0"/>
-              <a:t>08/03/2021</a:t>
+              <a:t>16/03/2021</a:t>
             </a:fld>
             <a:endParaRPr lang="en-GB"/>
           </a:p>
@@ -1468,7 +1468,7 @@
           <a:p>
             <a:fld id="{9C217E9C-8F4D-924D-9E3C-AB228D9DE283}" type="datetimeFigureOut">
               <a:rPr lang="en-GB" smtClean="0"/>
-              <a:t>08/03/2021</a:t>
+              <a:t>16/03/2021</a:t>
             </a:fld>
             <a:endParaRPr lang="en-GB"/>
           </a:p>
@@ -1880,7 +1880,7 @@
           <a:p>
             <a:fld id="{9C217E9C-8F4D-924D-9E3C-AB228D9DE283}" type="datetimeFigureOut">
               <a:rPr lang="en-GB" smtClean="0"/>
-              <a:t>08/03/2021</a:t>
+              <a:t>16/03/2021</a:t>
             </a:fld>
             <a:endParaRPr lang="en-GB"/>
           </a:p>
@@ -2021,7 +2021,7 @@
           <a:p>
             <a:fld id="{9C217E9C-8F4D-924D-9E3C-AB228D9DE283}" type="datetimeFigureOut">
               <a:rPr lang="en-GB" smtClean="0"/>
-              <a:t>08/03/2021</a:t>
+              <a:t>16/03/2021</a:t>
             </a:fld>
             <a:endParaRPr lang="en-GB"/>
           </a:p>
@@ -2134,7 +2134,7 @@
           <a:p>
             <a:fld id="{9C217E9C-8F4D-924D-9E3C-AB228D9DE283}" type="datetimeFigureOut">
               <a:rPr lang="en-GB" smtClean="0"/>
-              <a:t>08/03/2021</a:t>
+              <a:t>16/03/2021</a:t>
             </a:fld>
             <a:endParaRPr lang="en-GB"/>
           </a:p>
@@ -2445,7 +2445,7 @@
           <a:p>
             <a:fld id="{9C217E9C-8F4D-924D-9E3C-AB228D9DE283}" type="datetimeFigureOut">
               <a:rPr lang="en-GB" smtClean="0"/>
-              <a:t>08/03/2021</a:t>
+              <a:t>16/03/2021</a:t>
             </a:fld>
             <a:endParaRPr lang="en-GB"/>
           </a:p>
@@ -2733,7 +2733,7 @@
           <a:p>
             <a:fld id="{9C217E9C-8F4D-924D-9E3C-AB228D9DE283}" type="datetimeFigureOut">
               <a:rPr lang="en-GB" smtClean="0"/>
-              <a:t>08/03/2021</a:t>
+              <a:t>16/03/2021</a:t>
             </a:fld>
             <a:endParaRPr lang="en-GB"/>
           </a:p>
@@ -2974,7 +2974,7 @@
           <a:p>
             <a:fld id="{9C217E9C-8F4D-924D-9E3C-AB228D9DE283}" type="datetimeFigureOut">
               <a:rPr lang="en-GB" smtClean="0"/>
-              <a:t>08/03/2021</a:t>
+              <a:t>16/03/2021</a:t>
             </a:fld>
             <a:endParaRPr lang="en-GB"/>
           </a:p>
@@ -3416,7 +3416,7 @@
           </a:ln>
           <a:extLst>
             <a:ext uri="{C572A759-6A51-4108-AA02-DFA0A04FC94B}">
-              <ma14:wrappingTextBoxFlag xmlns="" xmlns:ma14="http://schemas.microsoft.com/office/mac/drawingml/2011/main" val="1"/>
+              <ma14:wrappingTextBoxFlag xmlns:ma14="http://schemas.microsoft.com/office/mac/drawingml/2011/main" xmlns="" val="1"/>
             </a:ext>
           </a:extLst>
         </p:spPr>
@@ -33904,18 +33904,20 @@
           </p:cNvPr>
           <p:cNvCxnSpPr>
             <a:cxnSpLocks/>
+            <a:stCxn id="9" idx="3"/>
             <a:endCxn id="5" idx="2"/>
           </p:cNvCxnSpPr>
           <p:nvPr/>
         </p:nvCxnSpPr>
         <p:spPr>
-          <a:xfrm rot="16200000" flipV="1">
-            <a:off x="3600" y="1795165"/>
-            <a:ext cx="1553839" cy="322393"/>
+          <a:xfrm flipH="1" flipV="1">
+            <a:off x="619322" y="1179442"/>
+            <a:ext cx="361825" cy="1630783"/>
           </a:xfrm>
-          <a:prstGeom prst="bentConnector3">
+          <a:prstGeom prst="bentConnector4">
             <a:avLst>
-              <a:gd name="adj1" fmla="val 87"/>
+              <a:gd name="adj1" fmla="val 99059"/>
+              <a:gd name="adj2" fmla="val 52359"/>
             </a:avLst>
           </a:prstGeom>
           <a:ln>
@@ -36023,6 +36025,305 @@
                 <a:cs typeface="Consolas" panose="020B0609020204030204" pitchFamily="49" charset="0"/>
               </a:rPr>
               <a:t>&gt;</a:t>
+            </a:r>
+          </a:p>
+        </p:txBody>
+      </p:sp>
+      <p:sp>
+        <p:nvSpPr>
+          <p:cNvPr id="39" name="Rounded Rectangle 38">
+            <a:extLst>
+              <a:ext uri="{FF2B5EF4-FFF2-40B4-BE49-F238E27FC236}">
+                <a16:creationId xmlns:a16="http://schemas.microsoft.com/office/drawing/2014/main" id="{DF8B4F46-DA45-2E4C-8E10-840945DA0BF8}"/>
+              </a:ext>
+            </a:extLst>
+          </p:cNvPr>
+          <p:cNvSpPr/>
+          <p:nvPr/>
+        </p:nvSpPr>
+        <p:spPr>
+          <a:xfrm>
+            <a:off x="94393" y="3489106"/>
+            <a:ext cx="974116" cy="264202"/>
+          </a:xfrm>
+          <a:prstGeom prst="roundRect">
+            <a:avLst/>
+          </a:prstGeom>
+          <a:solidFill>
+            <a:srgbClr val="FF0000"/>
+          </a:solidFill>
+          <a:ln>
+            <a:solidFill>
+              <a:schemeClr val="bg1">
+                <a:lumMod val="85000"/>
+              </a:schemeClr>
+            </a:solidFill>
+          </a:ln>
+        </p:spPr>
+        <p:style>
+          <a:lnRef idx="2">
+            <a:schemeClr val="accent1">
+              <a:shade val="50000"/>
+            </a:schemeClr>
+          </a:lnRef>
+          <a:fillRef idx="1">
+            <a:schemeClr val="accent1"/>
+          </a:fillRef>
+          <a:effectRef idx="0">
+            <a:schemeClr val="accent1"/>
+          </a:effectRef>
+          <a:fontRef idx="minor">
+            <a:schemeClr val="lt1"/>
+          </a:fontRef>
+        </p:style>
+        <p:txBody>
+          <a:bodyPr rtlCol="0" anchor="ctr"/>
+          <a:lstStyle/>
+          <a:p>
+            <a:pPr algn="ctr"/>
+            <a:r>
+              <a:rPr lang="en-GB" sz="600" b="1" dirty="0">
+                <a:solidFill>
+                  <a:schemeClr val="bg1"/>
+                </a:solidFill>
+                <a:latin typeface="Consolas" panose="020B0609020204030204" pitchFamily="49" charset="0"/>
+                <a:cs typeface="Consolas" panose="020B0609020204030204" pitchFamily="49" charset="0"/>
+              </a:rPr>
+              <a:t>&lt;&lt;</a:t>
+            </a:r>
+            <a:r>
+              <a:rPr lang="en-GB" sz="600" b="1" dirty="0" err="1">
+                <a:solidFill>
+                  <a:schemeClr val="bg1"/>
+                </a:solidFill>
+                <a:latin typeface="Consolas" panose="020B0609020204030204" pitchFamily="49" charset="0"/>
+                <a:cs typeface="Consolas" panose="020B0609020204030204" pitchFamily="49" charset="0"/>
+              </a:rPr>
+              <a:t>objectProperty</a:t>
+            </a:r>
+            <a:r>
+              <a:rPr lang="en-GB" sz="600" b="1" dirty="0">
+                <a:solidFill>
+                  <a:schemeClr val="bg1"/>
+                </a:solidFill>
+                <a:latin typeface="Consolas" panose="020B0609020204030204" pitchFamily="49" charset="0"/>
+                <a:cs typeface="Consolas" panose="020B0609020204030204" pitchFamily="49" charset="0"/>
+              </a:rPr>
+              <a:t>&gt;&gt;</a:t>
+            </a:r>
+          </a:p>
+          <a:p>
+            <a:pPr algn="ctr"/>
+            <a:r>
+              <a:rPr lang="en-GB" sz="600" b="1" dirty="0" err="1">
+                <a:solidFill>
+                  <a:schemeClr val="bg1"/>
+                </a:solidFill>
+                <a:latin typeface="Consolas" panose="020B0609020204030204" pitchFamily="49" charset="0"/>
+                <a:cs typeface="Consolas" panose="020B0609020204030204" pitchFamily="49" charset="0"/>
+              </a:rPr>
+              <a:t>measureClass</a:t>
+            </a:r>
+            <a:endParaRPr lang="en-GB" sz="600" b="1" dirty="0">
+              <a:solidFill>
+                <a:schemeClr val="bg1"/>
+              </a:solidFill>
+              <a:latin typeface="Consolas" panose="020B0609020204030204" pitchFamily="49" charset="0"/>
+              <a:cs typeface="Consolas" panose="020B0609020204030204" pitchFamily="49" charset="0"/>
+            </a:endParaRPr>
+          </a:p>
+        </p:txBody>
+      </p:sp>
+      <p:cxnSp>
+        <p:nvCxnSpPr>
+          <p:cNvPr id="40" name="Straight Arrow Connector 5">
+            <a:extLst>
+              <a:ext uri="{FF2B5EF4-FFF2-40B4-BE49-F238E27FC236}">
+                <a16:creationId xmlns:a16="http://schemas.microsoft.com/office/drawing/2014/main" id="{A99551CB-A2EB-4D45-A956-3D3AD2DD7820}"/>
+              </a:ext>
+            </a:extLst>
+          </p:cNvPr>
+          <p:cNvCxnSpPr>
+            <a:cxnSpLocks/>
+          </p:cNvCxnSpPr>
+          <p:nvPr/>
+        </p:nvCxnSpPr>
+        <p:spPr>
+          <a:xfrm flipV="1">
+            <a:off x="990382" y="3073530"/>
+            <a:ext cx="0" cy="415578"/>
+          </a:xfrm>
+          <a:prstGeom prst="straightConnector1">
+            <a:avLst/>
+          </a:prstGeom>
+          <a:ln>
+            <a:solidFill>
+              <a:schemeClr val="tx1"/>
+            </a:solidFill>
+            <a:headEnd type="none" w="med" len="med"/>
+            <a:tailEnd type="arrow" w="med" len="med"/>
+          </a:ln>
+        </p:spPr>
+        <p:style>
+          <a:lnRef idx="1">
+            <a:schemeClr val="accent1"/>
+          </a:lnRef>
+          <a:fillRef idx="0">
+            <a:schemeClr val="accent1"/>
+          </a:fillRef>
+          <a:effectRef idx="0">
+            <a:schemeClr val="accent1"/>
+          </a:effectRef>
+          <a:fontRef idx="minor">
+            <a:schemeClr val="tx1"/>
+          </a:fontRef>
+        </p:style>
+      </p:cxnSp>
+      <p:cxnSp>
+        <p:nvCxnSpPr>
+          <p:cNvPr id="43" name="Straight Arrow Connector 5">
+            <a:extLst>
+              <a:ext uri="{FF2B5EF4-FFF2-40B4-BE49-F238E27FC236}">
+                <a16:creationId xmlns:a16="http://schemas.microsoft.com/office/drawing/2014/main" id="{C0793C86-B05E-0D48-BBFA-6B770952E1C4}"/>
+              </a:ext>
+            </a:extLst>
+          </p:cNvPr>
+          <p:cNvCxnSpPr>
+            <a:cxnSpLocks/>
+          </p:cNvCxnSpPr>
+          <p:nvPr/>
+        </p:nvCxnSpPr>
+        <p:spPr>
+          <a:xfrm flipV="1">
+            <a:off x="334153" y="1179442"/>
+            <a:ext cx="0" cy="2309664"/>
+          </a:xfrm>
+          <a:prstGeom prst="straightConnector1">
+            <a:avLst/>
+          </a:prstGeom>
+          <a:ln>
+            <a:solidFill>
+              <a:schemeClr val="tx1"/>
+            </a:solidFill>
+            <a:headEnd type="none" w="med" len="med"/>
+            <a:tailEnd type="arrow" w="med" len="med"/>
+          </a:ln>
+        </p:spPr>
+        <p:style>
+          <a:lnRef idx="1">
+            <a:schemeClr val="accent1"/>
+          </a:lnRef>
+          <a:fillRef idx="0">
+            <a:schemeClr val="accent1"/>
+          </a:fillRef>
+          <a:effectRef idx="0">
+            <a:schemeClr val="accent1"/>
+          </a:effectRef>
+          <a:fontRef idx="minor">
+            <a:schemeClr val="tx1"/>
+          </a:fontRef>
+        </p:style>
+      </p:cxnSp>
+      <p:sp>
+        <p:nvSpPr>
+          <p:cNvPr id="48" name="TextBox 47">
+            <a:extLst>
+              <a:ext uri="{FF2B5EF4-FFF2-40B4-BE49-F238E27FC236}">
+                <a16:creationId xmlns:a16="http://schemas.microsoft.com/office/drawing/2014/main" id="{E8566CD5-1468-6D4B-BB24-3B2B0C61B336}"/>
+              </a:ext>
+            </a:extLst>
+          </p:cNvPr>
+          <p:cNvSpPr txBox="1"/>
+          <p:nvPr/>
+        </p:nvSpPr>
+        <p:spPr>
+          <a:xfrm>
+            <a:off x="219626" y="3168193"/>
+            <a:ext cx="580608" cy="153888"/>
+          </a:xfrm>
+          <a:prstGeom prst="rect">
+            <a:avLst/>
+          </a:prstGeom>
+          <a:noFill/>
+        </p:spPr>
+        <p:txBody>
+          <a:bodyPr wrap="none" rtlCol="0">
+            <a:spAutoFit/>
+          </a:bodyPr>
+          <a:lstStyle/>
+          <a:p>
+            <a:r>
+              <a:rPr lang="en-GB" sz="400" dirty="0">
+                <a:latin typeface="Roboto Mono" pitchFamily="2" charset="0"/>
+                <a:ea typeface="Roboto Mono" pitchFamily="2" charset="0"/>
+              </a:rPr>
+              <a:t>&lt;&lt;</a:t>
+            </a:r>
+            <a:r>
+              <a:rPr lang="en-GB" sz="400" dirty="0" err="1">
+                <a:latin typeface="Roboto Mono" pitchFamily="2" charset="0"/>
+                <a:ea typeface="Roboto Mono" pitchFamily="2" charset="0"/>
+              </a:rPr>
+              <a:t>rdfsRange</a:t>
+            </a:r>
+            <a:r>
+              <a:rPr lang="en-GB" sz="400" dirty="0">
+                <a:latin typeface="Roboto Mono" pitchFamily="2" charset="0"/>
+                <a:ea typeface="Roboto Mono" pitchFamily="2" charset="0"/>
+              </a:rPr>
+              <a:t>&gt;&gt;</a:t>
+            </a:r>
+          </a:p>
+        </p:txBody>
+      </p:sp>
+      <p:sp>
+        <p:nvSpPr>
+          <p:cNvPr id="49" name="TextBox 48">
+            <a:extLst>
+              <a:ext uri="{FF2B5EF4-FFF2-40B4-BE49-F238E27FC236}">
+                <a16:creationId xmlns:a16="http://schemas.microsoft.com/office/drawing/2014/main" id="{5E1879BC-1E1F-B442-A648-0651BD0F52ED}"/>
+              </a:ext>
+            </a:extLst>
+          </p:cNvPr>
+          <p:cNvSpPr txBox="1"/>
+          <p:nvPr/>
+        </p:nvSpPr>
+        <p:spPr>
+          <a:xfrm>
+            <a:off x="536043" y="3330598"/>
+            <a:ext cx="611065" cy="153888"/>
+          </a:xfrm>
+          <a:prstGeom prst="rect">
+            <a:avLst/>
+          </a:prstGeom>
+          <a:noFill/>
+        </p:spPr>
+        <p:txBody>
+          <a:bodyPr wrap="none" rtlCol="0">
+            <a:spAutoFit/>
+          </a:bodyPr>
+          <a:lstStyle/>
+          <a:p>
+            <a:r>
+              <a:rPr lang="en-GB" sz="400" dirty="0">
+                <a:latin typeface="Roboto Mono" pitchFamily="2" charset="0"/>
+                <a:ea typeface="Roboto Mono" pitchFamily="2" charset="0"/>
+              </a:rPr>
+              <a:t>&lt;&lt;</a:t>
+            </a:r>
+            <a:r>
+              <a:rPr lang="en-GB" sz="400" dirty="0" err="1">
+                <a:latin typeface="Roboto Mono" pitchFamily="2" charset="0"/>
+                <a:ea typeface="Roboto Mono" pitchFamily="2" charset="0"/>
+              </a:rPr>
+              <a:t>rdfsDomain</a:t>
+            </a:r>
+            <a:r>
+              <a:rPr lang="en-GB" sz="400" dirty="0">
+                <a:latin typeface="Roboto Mono" pitchFamily="2" charset="0"/>
+                <a:ea typeface="Roboto Mono" pitchFamily="2" charset="0"/>
+              </a:rPr>
+              <a:t>&gt;&gt;</a:t>
             </a:r>
           </a:p>
         </p:txBody>

</xml_diff>